<commit_message>
Final Space Apps Presentation
</commit_message>
<xml_diff>
--- a/Demo.pptx
+++ b/Demo.pptx
@@ -5,8 +5,11 @@
     <p:sldMasterId id="2147483648" r:id="rId1"/>
   </p:sldMasterIdLst>
   <p:sldIdLst>
-    <p:sldId id="256" r:id="rId2"/>
-    <p:sldId id="257" r:id="rId3"/>
+    <p:sldId id="258" r:id="rId2"/>
+    <p:sldId id="259" r:id="rId3"/>
+    <p:sldId id="256" r:id="rId4"/>
+    <p:sldId id="260" r:id="rId5"/>
+    <p:sldId id="261" r:id="rId6"/>
   </p:sldIdLst>
   <p:sldSz cx="12192000" cy="6858000"/>
   <p:notesSz cx="6858000" cy="9144000"/>
@@ -15495,7 +15498,7 @@
           <a:p>
             <a:fld id="{B86FD34F-B902-4E18-ADD4-E6A7617F3505}" type="datetimeFigureOut">
               <a:rPr lang="it-IT" smtClean="0"/>
-              <a:t>20/04/2013</a:t>
+              <a:t>21/04/2013</a:t>
             </a:fld>
             <a:endParaRPr lang="it-IT"/>
           </a:p>
@@ -15665,7 +15668,7 @@
           <a:p>
             <a:fld id="{B86FD34F-B902-4E18-ADD4-E6A7617F3505}" type="datetimeFigureOut">
               <a:rPr lang="it-IT" smtClean="0"/>
-              <a:t>20/04/2013</a:t>
+              <a:t>21/04/2013</a:t>
             </a:fld>
             <a:endParaRPr lang="it-IT"/>
           </a:p>
@@ -15845,7 +15848,7 @@
           <a:p>
             <a:fld id="{B86FD34F-B902-4E18-ADD4-E6A7617F3505}" type="datetimeFigureOut">
               <a:rPr lang="it-IT" smtClean="0"/>
-              <a:t>20/04/2013</a:t>
+              <a:t>21/04/2013</a:t>
             </a:fld>
             <a:endParaRPr lang="it-IT"/>
           </a:p>
@@ -16015,7 +16018,7 @@
           <a:p>
             <a:fld id="{B86FD34F-B902-4E18-ADD4-E6A7617F3505}" type="datetimeFigureOut">
               <a:rPr lang="it-IT" smtClean="0"/>
-              <a:t>20/04/2013</a:t>
+              <a:t>21/04/2013</a:t>
             </a:fld>
             <a:endParaRPr lang="it-IT"/>
           </a:p>
@@ -16261,7 +16264,7 @@
           <a:p>
             <a:fld id="{B86FD34F-B902-4E18-ADD4-E6A7617F3505}" type="datetimeFigureOut">
               <a:rPr lang="it-IT" smtClean="0"/>
-              <a:t>20/04/2013</a:t>
+              <a:t>21/04/2013</a:t>
             </a:fld>
             <a:endParaRPr lang="it-IT"/>
           </a:p>
@@ -16493,7 +16496,7 @@
           <a:p>
             <a:fld id="{B86FD34F-B902-4E18-ADD4-E6A7617F3505}" type="datetimeFigureOut">
               <a:rPr lang="it-IT" smtClean="0"/>
-              <a:t>20/04/2013</a:t>
+              <a:t>21/04/2013</a:t>
             </a:fld>
             <a:endParaRPr lang="it-IT"/>
           </a:p>
@@ -16860,7 +16863,7 @@
           <a:p>
             <a:fld id="{B86FD34F-B902-4E18-ADD4-E6A7617F3505}" type="datetimeFigureOut">
               <a:rPr lang="it-IT" smtClean="0"/>
-              <a:t>20/04/2013</a:t>
+              <a:t>21/04/2013</a:t>
             </a:fld>
             <a:endParaRPr lang="it-IT"/>
           </a:p>
@@ -16978,7 +16981,7 @@
           <a:p>
             <a:fld id="{B86FD34F-B902-4E18-ADD4-E6A7617F3505}" type="datetimeFigureOut">
               <a:rPr lang="it-IT" smtClean="0"/>
-              <a:t>20/04/2013</a:t>
+              <a:t>21/04/2013</a:t>
             </a:fld>
             <a:endParaRPr lang="it-IT"/>
           </a:p>
@@ -17073,7 +17076,7 @@
           <a:p>
             <a:fld id="{B86FD34F-B902-4E18-ADD4-E6A7617F3505}" type="datetimeFigureOut">
               <a:rPr lang="it-IT" smtClean="0"/>
-              <a:t>20/04/2013</a:t>
+              <a:t>21/04/2013</a:t>
             </a:fld>
             <a:endParaRPr lang="it-IT"/>
           </a:p>
@@ -17350,7 +17353,7 @@
           <a:p>
             <a:fld id="{B86FD34F-B902-4E18-ADD4-E6A7617F3505}" type="datetimeFigureOut">
               <a:rPr lang="it-IT" smtClean="0"/>
-              <a:t>20/04/2013</a:t>
+              <a:t>21/04/2013</a:t>
             </a:fld>
             <a:endParaRPr lang="it-IT"/>
           </a:p>
@@ -17603,7 +17606,7 @@
           <a:p>
             <a:fld id="{B86FD34F-B902-4E18-ADD4-E6A7617F3505}" type="datetimeFigureOut">
               <a:rPr lang="it-IT" smtClean="0"/>
-              <a:t>20/04/2013</a:t>
+              <a:t>21/04/2013</a:t>
             </a:fld>
             <a:endParaRPr lang="it-IT"/>
           </a:p>
@@ -17816,7 +17819,7 @@
           <a:p>
             <a:fld id="{B86FD34F-B902-4E18-ADD4-E6A7617F3505}" type="datetimeFigureOut">
               <a:rPr lang="it-IT" smtClean="0"/>
-              <a:t>20/04/2013</a:t>
+              <a:t>21/04/2013</a:t>
             </a:fld>
             <a:endParaRPr lang="it-IT"/>
           </a:p>
@@ -18206,6 +18209,164 @@
 
 <file path=ppt/slides/slide1.xml><?xml version="1.0" encoding="utf-8"?>
 <p:sld xmlns:a="http://schemas.openxmlformats.org/drawingml/2006/main" xmlns:r="http://schemas.openxmlformats.org/officeDocument/2006/relationships" xmlns:p="http://schemas.openxmlformats.org/presentationml/2006/main">
+  <p:cSld>
+    <p:spTree>
+      <p:nvGrpSpPr>
+        <p:cNvPr id="1" name=""/>
+        <p:cNvGrpSpPr/>
+        <p:nvPr/>
+      </p:nvGrpSpPr>
+      <p:grpSpPr>
+        <a:xfrm>
+          <a:off x="0" y="0"/>
+          <a:ext cx="0" cy="0"/>
+          <a:chOff x="0" y="0"/>
+          <a:chExt cx="0" cy="0"/>
+        </a:xfrm>
+      </p:grpSpPr>
+      <p:sp>
+        <p:nvSpPr>
+          <p:cNvPr id="2" name="Titolo 1"/>
+          <p:cNvSpPr>
+            <a:spLocks noGrp="1"/>
+          </p:cNvSpPr>
+          <p:nvPr>
+            <p:ph type="ctrTitle"/>
+          </p:nvPr>
+        </p:nvSpPr>
+        <p:spPr/>
+        <p:txBody>
+          <a:bodyPr/>
+          <a:lstStyle/>
+          <a:p>
+            <a:endParaRPr lang="it-IT"/>
+          </a:p>
+        </p:txBody>
+      </p:sp>
+      <p:sp>
+        <p:nvSpPr>
+          <p:cNvPr id="3" name="Sottotitolo 2"/>
+          <p:cNvSpPr>
+            <a:spLocks noGrp="1"/>
+          </p:cNvSpPr>
+          <p:nvPr>
+            <p:ph type="subTitle" idx="1"/>
+          </p:nvPr>
+        </p:nvSpPr>
+        <p:spPr/>
+        <p:txBody>
+          <a:bodyPr/>
+          <a:lstStyle/>
+          <a:p>
+            <a:endParaRPr lang="it-IT"/>
+          </a:p>
+        </p:txBody>
+      </p:sp>
+      <p:pic>
+        <p:nvPicPr>
+          <p:cNvPr id="4" name="Immagine 3"/>
+          <p:cNvPicPr>
+            <a:picLocks noChangeAspect="1"/>
+          </p:cNvPicPr>
+          <p:nvPr/>
+        </p:nvPicPr>
+        <p:blipFill>
+          <a:blip r:embed="rId2">
+            <a:extLst>
+              <a:ext uri="{28A0092B-C50C-407E-A947-70E740481C1C}">
+                <a14:useLocalDpi xmlns:a14="http://schemas.microsoft.com/office/drawing/2010/main" val="0"/>
+              </a:ext>
+            </a:extLst>
+          </a:blip>
+          <a:stretch>
+            <a:fillRect/>
+          </a:stretch>
+        </p:blipFill>
+        <p:spPr>
+          <a:xfrm>
+            <a:off x="0" y="1673"/>
+            <a:ext cx="12192000" cy="6854653"/>
+          </a:xfrm>
+          <a:prstGeom prst="rect">
+            <a:avLst/>
+          </a:prstGeom>
+        </p:spPr>
+      </p:pic>
+    </p:spTree>
+    <p:extLst>
+      <p:ext uri="{BB962C8B-B14F-4D97-AF65-F5344CB8AC3E}">
+        <p14:creationId xmlns:p14="http://schemas.microsoft.com/office/powerpoint/2010/main" val="1860520001"/>
+      </p:ext>
+    </p:extLst>
+  </p:cSld>
+  <p:clrMapOvr>
+    <a:masterClrMapping/>
+  </p:clrMapOvr>
+</p:sld>
+</file>
+
+<file path=ppt/slides/slide2.xml><?xml version="1.0" encoding="utf-8"?>
+<p:sld xmlns:a="http://schemas.openxmlformats.org/drawingml/2006/main" xmlns:r="http://schemas.openxmlformats.org/officeDocument/2006/relationships" xmlns:p="http://schemas.openxmlformats.org/presentationml/2006/main">
+  <p:cSld>
+    <p:spTree>
+      <p:nvGrpSpPr>
+        <p:cNvPr id="1" name=""/>
+        <p:cNvGrpSpPr/>
+        <p:nvPr/>
+      </p:nvGrpSpPr>
+      <p:grpSpPr>
+        <a:xfrm>
+          <a:off x="0" y="0"/>
+          <a:ext cx="0" cy="0"/>
+          <a:chOff x="0" y="0"/>
+          <a:chExt cx="0" cy="0"/>
+        </a:xfrm>
+      </p:grpSpPr>
+      <p:pic>
+        <p:nvPicPr>
+          <p:cNvPr id="2" name="Immagine 1"/>
+          <p:cNvPicPr>
+            <a:picLocks noChangeAspect="1"/>
+          </p:cNvPicPr>
+          <p:nvPr/>
+        </p:nvPicPr>
+        <p:blipFill>
+          <a:blip r:embed="rId2">
+            <a:extLst>
+              <a:ext uri="{28A0092B-C50C-407E-A947-70E740481C1C}">
+                <a14:useLocalDpi xmlns:a14="http://schemas.microsoft.com/office/drawing/2010/main" val="0"/>
+              </a:ext>
+            </a:extLst>
+          </a:blip>
+          <a:stretch>
+            <a:fillRect/>
+          </a:stretch>
+        </p:blipFill>
+        <p:spPr>
+          <a:xfrm>
+            <a:off x="0" y="1673"/>
+            <a:ext cx="12192000" cy="6854653"/>
+          </a:xfrm>
+          <a:prstGeom prst="rect">
+            <a:avLst/>
+          </a:prstGeom>
+        </p:spPr>
+      </p:pic>
+    </p:spTree>
+    <p:extLst>
+      <p:ext uri="{BB962C8B-B14F-4D97-AF65-F5344CB8AC3E}">
+        <p14:creationId xmlns:p14="http://schemas.microsoft.com/office/powerpoint/2010/main" val="4209685979"/>
+      </p:ext>
+    </p:extLst>
+  </p:cSld>
+  <p:clrMapOvr>
+    <a:masterClrMapping/>
+  </p:clrMapOvr>
+</p:sld>
+</file>
+
+<file path=ppt/slides/slide3.xml><?xml version="1.0" encoding="utf-8"?>
+<p:sld xmlns:a="http://schemas.openxmlformats.org/drawingml/2006/main" xmlns:r="http://schemas.openxmlformats.org/officeDocument/2006/relationships" xmlns:p="http://schemas.openxmlformats.org/presentationml/2006/main" show="0">
   <p:cSld>
     <p:spTree>
       <p:nvGrpSpPr>
@@ -18658,10 +18819,18 @@
   <p:clrMapOvr>
     <a:masterClrMapping/>
   </p:clrMapOvr>
+  <mc:AlternateContent xmlns:mc="http://schemas.openxmlformats.org/markup-compatibility/2006">
+    <mc:Choice xmlns:p14="http://schemas.microsoft.com/office/powerpoint/2010/main" Requires="p14">
+      <p:transition spd="slow" p14:dur="2000"/>
+    </mc:Choice>
+    <mc:Fallback>
+      <p:transition spd="slow"/>
+    </mc:Fallback>
+  </mc:AlternateContent>
 </p:sld>
 </file>
 
-<file path=ppt/slides/slide2.xml><?xml version="1.0" encoding="utf-8"?>
+<file path=ppt/slides/slide4.xml><?xml version="1.0" encoding="utf-8"?>
 <p:sld xmlns:a="http://schemas.openxmlformats.org/drawingml/2006/main" xmlns:r="http://schemas.openxmlformats.org/officeDocument/2006/relationships" xmlns:p="http://schemas.openxmlformats.org/presentationml/2006/main">
   <p:cSld>
     <p:spTree>
@@ -18678,1350 +18847,100 @@
           <a:chExt cx="0" cy="0"/>
         </a:xfrm>
       </p:grpSpPr>
-      <p:sp>
-        <p:nvSpPr>
-          <p:cNvPr id="17" name="Rettangolo 16"/>
-          <p:cNvSpPr/>
+      <p:pic>
+        <p:nvPicPr>
+          <p:cNvPr id="2" name="Immagine 1"/>
+          <p:cNvPicPr>
+            <a:picLocks noChangeAspect="1"/>
+          </p:cNvPicPr>
           <p:nvPr/>
-        </p:nvSpPr>
+        </p:nvPicPr>
+        <p:blipFill>
+          <a:blip r:embed="rId2">
+            <a:extLst>
+              <a:ext uri="{28A0092B-C50C-407E-A947-70E740481C1C}">
+                <a14:useLocalDpi xmlns:a14="http://schemas.microsoft.com/office/drawing/2010/main" val="0"/>
+              </a:ext>
+            </a:extLst>
+          </a:blip>
+          <a:stretch>
+            <a:fillRect/>
+          </a:stretch>
+        </p:blipFill>
         <p:spPr>
           <a:xfrm>
-            <a:off x="104916" y="-46979"/>
-            <a:ext cx="4707892" cy="923330"/>
+            <a:off x="0" y="1673"/>
+            <a:ext cx="12192000" cy="6854653"/>
           </a:xfrm>
           <a:prstGeom prst="rect">
             <a:avLst/>
           </a:prstGeom>
-          <a:noFill/>
         </p:spPr>
-        <p:txBody>
-          <a:bodyPr wrap="none" lIns="91440" tIns="45720" rIns="91440" bIns="45720">
-            <a:spAutoFit/>
-          </a:bodyPr>
-          <a:lstStyle/>
-          <a:p>
-            <a:pPr algn="ctr"/>
-            <a:r>
-              <a:rPr lang="it-IT" sz="5400" b="1" dirty="0" err="1" smtClean="0">
-                <a:ln w="9525">
-                  <a:solidFill>
-                    <a:schemeClr val="bg1"/>
-                  </a:solidFill>
-                  <a:prstDash val="solid"/>
-                </a:ln>
-                <a:solidFill>
-                  <a:schemeClr val="accent5"/>
-                </a:solidFill>
-                <a:effectLst>
-                  <a:outerShdw blurRad="12700" dist="38100" dir="2700000" algn="tl" rotWithShape="0">
-                    <a:schemeClr val="accent5">
-                      <a:lumMod val="60000"/>
-                      <a:lumOff val="40000"/>
-                    </a:schemeClr>
-                  </a:outerShdw>
-                </a:effectLst>
-              </a:rPr>
-              <a:t>Mission</a:t>
-            </a:r>
-            <a:r>
-              <a:rPr lang="it-IT" sz="5400" b="1" dirty="0" smtClean="0">
-                <a:ln w="9525">
-                  <a:solidFill>
-                    <a:schemeClr val="bg1"/>
-                  </a:solidFill>
-                  <a:prstDash val="solid"/>
-                </a:ln>
-                <a:solidFill>
-                  <a:schemeClr val="accent5"/>
-                </a:solidFill>
-                <a:effectLst>
-                  <a:outerShdw blurRad="12700" dist="38100" dir="2700000" algn="tl" rotWithShape="0">
-                    <a:schemeClr val="accent5">
-                      <a:lumMod val="60000"/>
-                      <a:lumOff val="40000"/>
-                    </a:schemeClr>
-                  </a:outerShdw>
-                </a:effectLst>
-              </a:rPr>
-              <a:t> Control</a:t>
-            </a:r>
-            <a:endParaRPr lang="it-IT" sz="5400" b="1" dirty="0" smtClean="0">
-              <a:ln w="9525">
-                <a:solidFill>
-                  <a:schemeClr val="bg1"/>
-                </a:solidFill>
-                <a:prstDash val="solid"/>
-              </a:ln>
-              <a:solidFill>
-                <a:schemeClr val="accent5"/>
-              </a:solidFill>
-              <a:effectLst>
-                <a:outerShdw blurRad="12700" dist="38100" dir="2700000" algn="tl" rotWithShape="0">
-                  <a:schemeClr val="accent5">
-                    <a:lumMod val="60000"/>
-                    <a:lumOff val="40000"/>
-                  </a:schemeClr>
-                </a:outerShdw>
-              </a:effectLst>
-            </a:endParaRPr>
-          </a:p>
-        </p:txBody>
-      </p:sp>
-      <p:grpSp>
-        <p:nvGrpSpPr>
-          <p:cNvPr id="48" name="Gruppo 47"/>
-          <p:cNvGrpSpPr/>
+      </p:pic>
+    </p:spTree>
+    <p:extLst>
+      <p:ext uri="{BB962C8B-B14F-4D97-AF65-F5344CB8AC3E}">
+        <p14:creationId xmlns:p14="http://schemas.microsoft.com/office/powerpoint/2010/main" val="1355101850"/>
+      </p:ext>
+    </p:extLst>
+  </p:cSld>
+  <p:clrMapOvr>
+    <a:masterClrMapping/>
+  </p:clrMapOvr>
+</p:sld>
+</file>
+
+<file path=ppt/slides/slide5.xml><?xml version="1.0" encoding="utf-8"?>
+<p:sld xmlns:a="http://schemas.openxmlformats.org/drawingml/2006/main" xmlns:r="http://schemas.openxmlformats.org/officeDocument/2006/relationships" xmlns:p="http://schemas.openxmlformats.org/presentationml/2006/main">
+  <p:cSld>
+    <p:spTree>
+      <p:nvGrpSpPr>
+        <p:cNvPr id="1" name=""/>
+        <p:cNvGrpSpPr/>
+        <p:nvPr/>
+      </p:nvGrpSpPr>
+      <p:grpSpPr>
+        <a:xfrm>
+          <a:off x="0" y="0"/>
+          <a:ext cx="0" cy="0"/>
+          <a:chOff x="0" y="0"/>
+          <a:chExt cx="0" cy="0"/>
+        </a:xfrm>
+      </p:grpSpPr>
+      <p:pic>
+        <p:nvPicPr>
+          <p:cNvPr id="2" name="Immagine 1"/>
+          <p:cNvPicPr>
+            <a:picLocks noChangeAspect="1"/>
+          </p:cNvPicPr>
           <p:nvPr/>
-        </p:nvGrpSpPr>
-        <p:grpSpPr>
-          <a:xfrm>
-            <a:off x="236896" y="876351"/>
-            <a:ext cx="4569869" cy="2454583"/>
-            <a:chOff x="1" y="782529"/>
-            <a:chExt cx="4569869" cy="2454583"/>
-          </a:xfrm>
-        </p:grpSpPr>
-        <p:sp>
-          <p:nvSpPr>
-            <p:cNvPr id="10" name="Rettangolo 9"/>
-            <p:cNvSpPr/>
-            <p:nvPr/>
-          </p:nvSpPr>
-          <p:spPr>
-            <a:xfrm rot="16200000">
-              <a:off x="-765626" y="1548156"/>
-              <a:ext cx="2454583" cy="923330"/>
-            </a:xfrm>
-            <a:prstGeom prst="rect">
-              <a:avLst/>
-            </a:prstGeom>
-            <a:noFill/>
-          </p:spPr>
-          <p:txBody>
-            <a:bodyPr wrap="none" lIns="91440" tIns="45720" rIns="91440" bIns="45720">
-              <a:spAutoFit/>
-            </a:bodyPr>
-            <a:lstStyle/>
-            <a:p>
-              <a:pPr algn="ctr"/>
-              <a:r>
-                <a:rPr lang="it-IT" sz="5400" b="0" cap="none" spc="0" dirty="0" smtClean="0">
-                  <a:ln w="0"/>
-                  <a:solidFill>
-                    <a:schemeClr val="accent1"/>
-                  </a:solidFill>
-                  <a:effectLst>
-                    <a:outerShdw blurRad="38100" dist="25400" dir="5400000" algn="ctr" rotWithShape="0">
-                      <a:srgbClr val="6E747A">
-                        <a:alpha val="43000"/>
-                      </a:srgbClr>
-                    </a:outerShdw>
-                  </a:effectLst>
-                </a:rPr>
-                <a:t>Group 1</a:t>
-              </a:r>
-            </a:p>
-          </p:txBody>
-        </p:sp>
-        <p:pic>
-          <p:nvPicPr>
-            <p:cNvPr id="20" name="Immagine 19"/>
-            <p:cNvPicPr>
-              <a:picLocks noChangeAspect="1"/>
-            </p:cNvPicPr>
-            <p:nvPr/>
-          </p:nvPicPr>
-          <p:blipFill>
-            <a:blip r:embed="rId2" cstate="print">
-              <a:extLst>
-                <a:ext uri="{28A0092B-C50C-407E-A947-70E740481C1C}">
-                  <a14:useLocalDpi xmlns:a14="http://schemas.microsoft.com/office/drawing/2010/main" val="0"/>
-                </a:ext>
-              </a:extLst>
-            </a:blip>
-            <a:stretch>
-              <a:fillRect/>
-            </a:stretch>
-          </p:blipFill>
-          <p:spPr>
-            <a:xfrm>
-              <a:off x="923331" y="1712452"/>
-              <a:ext cx="661736" cy="661736"/>
-            </a:xfrm>
-            <a:prstGeom prst="rect">
-              <a:avLst/>
-            </a:prstGeom>
-          </p:spPr>
-        </p:pic>
-        <p:pic>
-          <p:nvPicPr>
-            <p:cNvPr id="25" name="Immagine 24"/>
-            <p:cNvPicPr>
-              <a:picLocks noChangeAspect="1"/>
-            </p:cNvPicPr>
-            <p:nvPr/>
-          </p:nvPicPr>
-          <p:blipFill>
-            <a:blip r:embed="rId3">
-              <a:extLst>
-                <a:ext uri="{28A0092B-C50C-407E-A947-70E740481C1C}">
-                  <a14:useLocalDpi xmlns:a14="http://schemas.microsoft.com/office/drawing/2010/main" val="0"/>
-                </a:ext>
-              </a:extLst>
-            </a:blip>
-            <a:stretch>
-              <a:fillRect/>
-            </a:stretch>
-          </p:blipFill>
-          <p:spPr>
-            <a:xfrm>
-              <a:off x="883858" y="894958"/>
-              <a:ext cx="740682" cy="730250"/>
-            </a:xfrm>
-            <a:prstGeom prst="rect">
-              <a:avLst/>
-            </a:prstGeom>
-          </p:spPr>
-        </p:pic>
-        <p:pic>
-          <p:nvPicPr>
-            <p:cNvPr id="30" name="Immagine 29"/>
-            <p:cNvPicPr>
-              <a:picLocks noChangeAspect="1"/>
-            </p:cNvPicPr>
-            <p:nvPr/>
-          </p:nvPicPr>
-          <p:blipFill>
-            <a:blip r:embed="rId4">
-              <a:extLst>
-                <a:ext uri="{28A0092B-C50C-407E-A947-70E740481C1C}">
-                  <a14:useLocalDpi xmlns:a14="http://schemas.microsoft.com/office/drawing/2010/main" val="0"/>
-                </a:ext>
-              </a:extLst>
-            </a:blip>
-            <a:stretch>
-              <a:fillRect/>
-            </a:stretch>
-          </p:blipFill>
-          <p:spPr>
-            <a:xfrm>
-              <a:off x="749059" y="2448658"/>
-              <a:ext cx="1089225" cy="677333"/>
-            </a:xfrm>
-            <a:prstGeom prst="rect">
-              <a:avLst/>
-            </a:prstGeom>
-          </p:spPr>
-        </p:pic>
-        <p:sp>
-          <p:nvSpPr>
-            <p:cNvPr id="36" name="CasellaDiTesto 35"/>
-            <p:cNvSpPr txBox="1"/>
-            <p:nvPr/>
-          </p:nvSpPr>
-          <p:spPr>
-            <a:xfrm>
-              <a:off x="1965788" y="881147"/>
-              <a:ext cx="2604082" cy="646331"/>
-            </a:xfrm>
-            <a:prstGeom prst="rect">
-              <a:avLst/>
-            </a:prstGeom>
-            <a:solidFill>
-              <a:schemeClr val="accent1">
-                <a:lumMod val="75000"/>
-              </a:schemeClr>
-            </a:solidFill>
-          </p:spPr>
-          <p:txBody>
-            <a:bodyPr wrap="square" rtlCol="0">
-              <a:spAutoFit/>
-            </a:bodyPr>
-            <a:lstStyle/>
-            <a:p>
-              <a:r>
-                <a:rPr lang="it-IT" sz="3600" dirty="0" smtClean="0"/>
-                <a:t>100%</a:t>
-              </a:r>
-              <a:endParaRPr lang="it-IT" sz="3600" dirty="0"/>
-            </a:p>
-          </p:txBody>
-        </p:sp>
-        <p:sp>
-          <p:nvSpPr>
-            <p:cNvPr id="43" name="CasellaDiTesto 42"/>
-            <p:cNvSpPr txBox="1"/>
-            <p:nvPr/>
-          </p:nvSpPr>
-          <p:spPr>
-            <a:xfrm>
-              <a:off x="1971830" y="2431502"/>
-              <a:ext cx="2598040" cy="646331"/>
-            </a:xfrm>
-            <a:prstGeom prst="rect">
-              <a:avLst/>
-            </a:prstGeom>
-            <a:noFill/>
-            <a:ln>
-              <a:solidFill>
-                <a:srgbClr val="00B050"/>
-              </a:solidFill>
-            </a:ln>
-          </p:spPr>
-          <p:txBody>
-            <a:bodyPr wrap="square" rtlCol="0">
-              <a:spAutoFit/>
-            </a:bodyPr>
-            <a:lstStyle/>
-            <a:p>
-              <a:r>
-                <a:rPr lang="it-IT" sz="3600" dirty="0" smtClean="0"/>
-                <a:t>0%</a:t>
-              </a:r>
-              <a:endParaRPr lang="it-IT" sz="3600" dirty="0"/>
-            </a:p>
-          </p:txBody>
-        </p:sp>
-        <p:sp>
-          <p:nvSpPr>
-            <p:cNvPr id="47" name="CasellaDiTesto 46"/>
-            <p:cNvSpPr txBox="1"/>
-            <p:nvPr/>
-          </p:nvSpPr>
-          <p:spPr>
-            <a:xfrm>
-              <a:off x="1965786" y="1656324"/>
-              <a:ext cx="2064519" cy="646331"/>
-            </a:xfrm>
-            <a:prstGeom prst="rect">
-              <a:avLst/>
-            </a:prstGeom>
-            <a:solidFill>
-              <a:srgbClr val="FFC000"/>
-            </a:solidFill>
-            <a:ln>
-              <a:solidFill>
-                <a:srgbClr val="FFC000"/>
-              </a:solidFill>
-            </a:ln>
-          </p:spPr>
-          <p:txBody>
-            <a:bodyPr wrap="square" rtlCol="0">
-              <a:spAutoFit/>
-            </a:bodyPr>
-            <a:lstStyle/>
-            <a:p>
-              <a:r>
-                <a:rPr lang="it-IT" sz="3600" dirty="0" smtClean="0"/>
-                <a:t>80%</a:t>
-              </a:r>
-              <a:endParaRPr lang="it-IT" sz="3600" dirty="0"/>
-            </a:p>
-          </p:txBody>
-        </p:sp>
-      </p:grpSp>
-      <p:grpSp>
-        <p:nvGrpSpPr>
-          <p:cNvPr id="81" name="Gruppo 80"/>
-          <p:cNvGrpSpPr/>
-          <p:nvPr/>
-        </p:nvGrpSpPr>
-        <p:grpSpPr>
-          <a:xfrm>
-            <a:off x="5081821" y="850748"/>
-            <a:ext cx="4569868" cy="2454583"/>
-            <a:chOff x="1" y="782529"/>
-            <a:chExt cx="4569868" cy="2454583"/>
-          </a:xfrm>
-        </p:grpSpPr>
-        <p:sp>
-          <p:nvSpPr>
-            <p:cNvPr id="82" name="Rettangolo 81"/>
-            <p:cNvSpPr/>
-            <p:nvPr/>
-          </p:nvSpPr>
-          <p:spPr>
-            <a:xfrm rot="16200000">
-              <a:off x="-765626" y="1548156"/>
-              <a:ext cx="2454583" cy="923330"/>
-            </a:xfrm>
-            <a:prstGeom prst="rect">
-              <a:avLst/>
-            </a:prstGeom>
-            <a:noFill/>
-          </p:spPr>
-          <p:txBody>
-            <a:bodyPr wrap="none" lIns="91440" tIns="45720" rIns="91440" bIns="45720">
-              <a:spAutoFit/>
-            </a:bodyPr>
-            <a:lstStyle/>
-            <a:p>
-              <a:pPr algn="ctr"/>
-              <a:r>
-                <a:rPr lang="it-IT" sz="5400" b="0" cap="none" spc="0" dirty="0" smtClean="0">
-                  <a:ln w="0"/>
-                  <a:solidFill>
-                    <a:schemeClr val="accent1"/>
-                  </a:solidFill>
-                  <a:effectLst>
-                    <a:outerShdw blurRad="38100" dist="25400" dir="5400000" algn="ctr" rotWithShape="0">
-                      <a:srgbClr val="6E747A">
-                        <a:alpha val="43000"/>
-                      </a:srgbClr>
-                    </a:outerShdw>
-                  </a:effectLst>
-                </a:rPr>
-                <a:t>Group </a:t>
-              </a:r>
-              <a:r>
-                <a:rPr lang="it-IT" sz="5400" b="0" cap="none" spc="0" dirty="0" smtClean="0">
-                  <a:ln w="0"/>
-                  <a:solidFill>
-                    <a:schemeClr val="accent1"/>
-                  </a:solidFill>
-                  <a:effectLst>
-                    <a:outerShdw blurRad="38100" dist="25400" dir="5400000" algn="ctr" rotWithShape="0">
-                      <a:srgbClr val="6E747A">
-                        <a:alpha val="43000"/>
-                      </a:srgbClr>
-                    </a:outerShdw>
-                  </a:effectLst>
-                </a:rPr>
-                <a:t>3</a:t>
-              </a:r>
-              <a:endParaRPr lang="it-IT" sz="5400" b="0" cap="none" spc="0" dirty="0" smtClean="0">
-                <a:ln w="0"/>
-                <a:solidFill>
-                  <a:schemeClr val="accent1"/>
-                </a:solidFill>
-                <a:effectLst>
-                  <a:outerShdw blurRad="38100" dist="25400" dir="5400000" algn="ctr" rotWithShape="0">
-                    <a:srgbClr val="6E747A">
-                      <a:alpha val="43000"/>
-                    </a:srgbClr>
-                  </a:outerShdw>
-                </a:effectLst>
-              </a:endParaRPr>
-            </a:p>
-          </p:txBody>
-        </p:sp>
-        <p:pic>
-          <p:nvPicPr>
-            <p:cNvPr id="83" name="Immagine 82"/>
-            <p:cNvPicPr>
-              <a:picLocks noChangeAspect="1"/>
-            </p:cNvPicPr>
-            <p:nvPr/>
-          </p:nvPicPr>
-          <p:blipFill>
-            <a:blip r:embed="rId2" cstate="print">
-              <a:extLst>
-                <a:ext uri="{28A0092B-C50C-407E-A947-70E740481C1C}">
-                  <a14:useLocalDpi xmlns:a14="http://schemas.microsoft.com/office/drawing/2010/main" val="0"/>
-                </a:ext>
-              </a:extLst>
-            </a:blip>
-            <a:stretch>
-              <a:fillRect/>
-            </a:stretch>
-          </p:blipFill>
-          <p:spPr>
-            <a:xfrm>
-              <a:off x="923331" y="1712452"/>
-              <a:ext cx="661736" cy="661736"/>
-            </a:xfrm>
-            <a:prstGeom prst="rect">
-              <a:avLst/>
-            </a:prstGeom>
-          </p:spPr>
-        </p:pic>
-        <p:pic>
-          <p:nvPicPr>
-            <p:cNvPr id="84" name="Immagine 83"/>
-            <p:cNvPicPr>
-              <a:picLocks noChangeAspect="1"/>
-            </p:cNvPicPr>
-            <p:nvPr/>
-          </p:nvPicPr>
-          <p:blipFill>
-            <a:blip r:embed="rId3">
-              <a:extLst>
-                <a:ext uri="{28A0092B-C50C-407E-A947-70E740481C1C}">
-                  <a14:useLocalDpi xmlns:a14="http://schemas.microsoft.com/office/drawing/2010/main" val="0"/>
-                </a:ext>
-              </a:extLst>
-            </a:blip>
-            <a:stretch>
-              <a:fillRect/>
-            </a:stretch>
-          </p:blipFill>
-          <p:spPr>
-            <a:xfrm>
-              <a:off x="883858" y="894958"/>
-              <a:ext cx="740682" cy="730250"/>
-            </a:xfrm>
-            <a:prstGeom prst="rect">
-              <a:avLst/>
-            </a:prstGeom>
-          </p:spPr>
-        </p:pic>
-        <p:pic>
-          <p:nvPicPr>
-            <p:cNvPr id="85" name="Immagine 84"/>
-            <p:cNvPicPr>
-              <a:picLocks noChangeAspect="1"/>
-            </p:cNvPicPr>
-            <p:nvPr/>
-          </p:nvPicPr>
-          <p:blipFill>
-            <a:blip r:embed="rId4">
-              <a:extLst>
-                <a:ext uri="{28A0092B-C50C-407E-A947-70E740481C1C}">
-                  <a14:useLocalDpi xmlns:a14="http://schemas.microsoft.com/office/drawing/2010/main" val="0"/>
-                </a:ext>
-              </a:extLst>
-            </a:blip>
-            <a:stretch>
-              <a:fillRect/>
-            </a:stretch>
-          </p:blipFill>
-          <p:spPr>
-            <a:xfrm>
-              <a:off x="749059" y="2448658"/>
-              <a:ext cx="1089225" cy="677333"/>
-            </a:xfrm>
-            <a:prstGeom prst="rect">
-              <a:avLst/>
-            </a:prstGeom>
-          </p:spPr>
-        </p:pic>
-        <p:sp>
-          <p:nvSpPr>
-            <p:cNvPr id="86" name="CasellaDiTesto 85"/>
-            <p:cNvSpPr txBox="1"/>
-            <p:nvPr/>
-          </p:nvSpPr>
-          <p:spPr>
-            <a:xfrm>
-              <a:off x="1965788" y="881147"/>
-              <a:ext cx="2363092" cy="646331"/>
-            </a:xfrm>
-            <a:prstGeom prst="rect">
-              <a:avLst/>
-            </a:prstGeom>
-            <a:solidFill>
-              <a:schemeClr val="accent1">
-                <a:lumMod val="75000"/>
-              </a:schemeClr>
-            </a:solidFill>
-          </p:spPr>
-          <p:txBody>
-            <a:bodyPr wrap="square" rtlCol="0">
-              <a:spAutoFit/>
-            </a:bodyPr>
-            <a:lstStyle/>
-            <a:p>
-              <a:r>
-                <a:rPr lang="it-IT" sz="3600" dirty="0" smtClean="0"/>
-                <a:t>90%</a:t>
-              </a:r>
-              <a:endParaRPr lang="it-IT" sz="3600" dirty="0"/>
-            </a:p>
-          </p:txBody>
-        </p:sp>
-        <p:sp>
-          <p:nvSpPr>
-            <p:cNvPr id="87" name="CasellaDiTesto 86"/>
-            <p:cNvSpPr txBox="1"/>
-            <p:nvPr/>
-          </p:nvSpPr>
-          <p:spPr>
-            <a:xfrm>
-              <a:off x="1971830" y="2431502"/>
-              <a:ext cx="2598039" cy="646331"/>
-            </a:xfrm>
-            <a:prstGeom prst="rect">
-              <a:avLst/>
-            </a:prstGeom>
-            <a:noFill/>
-            <a:ln>
-              <a:solidFill>
-                <a:srgbClr val="00B050"/>
-              </a:solidFill>
-            </a:ln>
-          </p:spPr>
-          <p:txBody>
-            <a:bodyPr wrap="square" rtlCol="0">
-              <a:spAutoFit/>
-            </a:bodyPr>
-            <a:lstStyle/>
-            <a:p>
-              <a:r>
-                <a:rPr lang="it-IT" sz="3600" dirty="0" smtClean="0"/>
-                <a:t>0%</a:t>
-              </a:r>
-              <a:endParaRPr lang="it-IT" sz="3600" dirty="0"/>
-            </a:p>
-          </p:txBody>
-        </p:sp>
-        <p:sp>
-          <p:nvSpPr>
-            <p:cNvPr id="88" name="CasellaDiTesto 87"/>
-            <p:cNvSpPr txBox="1"/>
-            <p:nvPr/>
-          </p:nvSpPr>
-          <p:spPr>
-            <a:xfrm>
-              <a:off x="1965787" y="1656324"/>
-              <a:ext cx="1141188" cy="646331"/>
-            </a:xfrm>
-            <a:prstGeom prst="rect">
-              <a:avLst/>
-            </a:prstGeom>
-            <a:solidFill>
-              <a:srgbClr val="FFC000"/>
-            </a:solidFill>
-            <a:ln>
-              <a:solidFill>
-                <a:srgbClr val="FFC000"/>
-              </a:solidFill>
-            </a:ln>
-          </p:spPr>
-          <p:txBody>
-            <a:bodyPr wrap="square" rtlCol="0">
-              <a:spAutoFit/>
-            </a:bodyPr>
-            <a:lstStyle/>
-            <a:p>
-              <a:r>
-                <a:rPr lang="it-IT" sz="3600" dirty="0" smtClean="0"/>
-                <a:t>30%</a:t>
-              </a:r>
-              <a:endParaRPr lang="it-IT" sz="3600" dirty="0"/>
-            </a:p>
-          </p:txBody>
-        </p:sp>
-      </p:grpSp>
-      <p:grpSp>
-        <p:nvGrpSpPr>
-          <p:cNvPr id="89" name="Gruppo 88"/>
-          <p:cNvGrpSpPr/>
-          <p:nvPr/>
-        </p:nvGrpSpPr>
-        <p:grpSpPr>
-          <a:xfrm>
-            <a:off x="5081822" y="3684370"/>
-            <a:ext cx="4569868" cy="2454583"/>
-            <a:chOff x="1" y="782529"/>
-            <a:chExt cx="4569868" cy="2454583"/>
-          </a:xfrm>
-        </p:grpSpPr>
-        <p:sp>
-          <p:nvSpPr>
-            <p:cNvPr id="90" name="Rettangolo 89"/>
-            <p:cNvSpPr/>
-            <p:nvPr/>
-          </p:nvSpPr>
-          <p:spPr>
-            <a:xfrm rot="16200000">
-              <a:off x="-765626" y="1548156"/>
-              <a:ext cx="2454583" cy="923330"/>
-            </a:xfrm>
-            <a:prstGeom prst="rect">
-              <a:avLst/>
-            </a:prstGeom>
-            <a:noFill/>
-          </p:spPr>
-          <p:txBody>
-            <a:bodyPr wrap="none" lIns="91440" tIns="45720" rIns="91440" bIns="45720">
-              <a:spAutoFit/>
-            </a:bodyPr>
-            <a:lstStyle/>
-            <a:p>
-              <a:pPr algn="ctr"/>
-              <a:r>
-                <a:rPr lang="it-IT" sz="5400" b="0" cap="none" spc="0" dirty="0" smtClean="0">
-                  <a:ln w="0"/>
-                  <a:solidFill>
-                    <a:schemeClr val="accent1"/>
-                  </a:solidFill>
-                  <a:effectLst>
-                    <a:outerShdw blurRad="38100" dist="25400" dir="5400000" algn="ctr" rotWithShape="0">
-                      <a:srgbClr val="6E747A">
-                        <a:alpha val="43000"/>
-                      </a:srgbClr>
-                    </a:outerShdw>
-                  </a:effectLst>
-                </a:rPr>
-                <a:t>Group </a:t>
-              </a:r>
-              <a:r>
-                <a:rPr lang="it-IT" sz="5400" b="0" cap="none" spc="0" dirty="0" smtClean="0">
-                  <a:ln w="0"/>
-                  <a:solidFill>
-                    <a:schemeClr val="accent1"/>
-                  </a:solidFill>
-                  <a:effectLst>
-                    <a:outerShdw blurRad="38100" dist="25400" dir="5400000" algn="ctr" rotWithShape="0">
-                      <a:srgbClr val="6E747A">
-                        <a:alpha val="43000"/>
-                      </a:srgbClr>
-                    </a:outerShdw>
-                  </a:effectLst>
-                </a:rPr>
-                <a:t>4</a:t>
-              </a:r>
-              <a:endParaRPr lang="it-IT" sz="5400" b="0" cap="none" spc="0" dirty="0" smtClean="0">
-                <a:ln w="0"/>
-                <a:solidFill>
-                  <a:schemeClr val="accent1"/>
-                </a:solidFill>
-                <a:effectLst>
-                  <a:outerShdw blurRad="38100" dist="25400" dir="5400000" algn="ctr" rotWithShape="0">
-                    <a:srgbClr val="6E747A">
-                      <a:alpha val="43000"/>
-                    </a:srgbClr>
-                  </a:outerShdw>
-                </a:effectLst>
-              </a:endParaRPr>
-            </a:p>
-          </p:txBody>
-        </p:sp>
-        <p:pic>
-          <p:nvPicPr>
-            <p:cNvPr id="91" name="Immagine 90"/>
-            <p:cNvPicPr>
-              <a:picLocks noChangeAspect="1"/>
-            </p:cNvPicPr>
-            <p:nvPr/>
-          </p:nvPicPr>
-          <p:blipFill>
-            <a:blip r:embed="rId2" cstate="print">
-              <a:extLst>
-                <a:ext uri="{28A0092B-C50C-407E-A947-70E740481C1C}">
-                  <a14:useLocalDpi xmlns:a14="http://schemas.microsoft.com/office/drawing/2010/main" val="0"/>
-                </a:ext>
-              </a:extLst>
-            </a:blip>
-            <a:stretch>
-              <a:fillRect/>
-            </a:stretch>
-          </p:blipFill>
-          <p:spPr>
-            <a:xfrm>
-              <a:off x="923331" y="1712452"/>
-              <a:ext cx="661736" cy="661736"/>
-            </a:xfrm>
-            <a:prstGeom prst="rect">
-              <a:avLst/>
-            </a:prstGeom>
-          </p:spPr>
-        </p:pic>
-        <p:pic>
-          <p:nvPicPr>
-            <p:cNvPr id="92" name="Immagine 91"/>
-            <p:cNvPicPr>
-              <a:picLocks noChangeAspect="1"/>
-            </p:cNvPicPr>
-            <p:nvPr/>
-          </p:nvPicPr>
-          <p:blipFill>
-            <a:blip r:embed="rId3">
-              <a:extLst>
-                <a:ext uri="{28A0092B-C50C-407E-A947-70E740481C1C}">
-                  <a14:useLocalDpi xmlns:a14="http://schemas.microsoft.com/office/drawing/2010/main" val="0"/>
-                </a:ext>
-              </a:extLst>
-            </a:blip>
-            <a:stretch>
-              <a:fillRect/>
-            </a:stretch>
-          </p:blipFill>
-          <p:spPr>
-            <a:xfrm>
-              <a:off x="883858" y="894958"/>
-              <a:ext cx="740682" cy="730250"/>
-            </a:xfrm>
-            <a:prstGeom prst="rect">
-              <a:avLst/>
-            </a:prstGeom>
-          </p:spPr>
-        </p:pic>
-        <p:pic>
-          <p:nvPicPr>
-            <p:cNvPr id="93" name="Immagine 92"/>
-            <p:cNvPicPr>
-              <a:picLocks noChangeAspect="1"/>
-            </p:cNvPicPr>
-            <p:nvPr/>
-          </p:nvPicPr>
-          <p:blipFill>
-            <a:blip r:embed="rId4">
-              <a:extLst>
-                <a:ext uri="{28A0092B-C50C-407E-A947-70E740481C1C}">
-                  <a14:useLocalDpi xmlns:a14="http://schemas.microsoft.com/office/drawing/2010/main" val="0"/>
-                </a:ext>
-              </a:extLst>
-            </a:blip>
-            <a:stretch>
-              <a:fillRect/>
-            </a:stretch>
-          </p:blipFill>
-          <p:spPr>
-            <a:xfrm>
-              <a:off x="749059" y="2448658"/>
-              <a:ext cx="1089225" cy="677333"/>
-            </a:xfrm>
-            <a:prstGeom prst="rect">
-              <a:avLst/>
-            </a:prstGeom>
-          </p:spPr>
-        </p:pic>
-        <p:sp>
-          <p:nvSpPr>
-            <p:cNvPr id="94" name="CasellaDiTesto 93"/>
-            <p:cNvSpPr txBox="1"/>
-            <p:nvPr/>
-          </p:nvSpPr>
-          <p:spPr>
-            <a:xfrm>
-              <a:off x="1965788" y="881147"/>
-              <a:ext cx="2158147" cy="646331"/>
-            </a:xfrm>
-            <a:prstGeom prst="rect">
-              <a:avLst/>
-            </a:prstGeom>
-            <a:solidFill>
-              <a:schemeClr val="accent1">
-                <a:lumMod val="75000"/>
-              </a:schemeClr>
-            </a:solidFill>
-          </p:spPr>
-          <p:txBody>
-            <a:bodyPr wrap="square" rtlCol="0">
-              <a:spAutoFit/>
-            </a:bodyPr>
-            <a:lstStyle/>
-            <a:p>
-              <a:r>
-                <a:rPr lang="it-IT" sz="3600" dirty="0" smtClean="0"/>
-                <a:t>80%</a:t>
-              </a:r>
-              <a:endParaRPr lang="it-IT" sz="3600" dirty="0"/>
-            </a:p>
-          </p:txBody>
-        </p:sp>
-        <p:sp>
-          <p:nvSpPr>
-            <p:cNvPr id="95" name="CasellaDiTesto 94"/>
-            <p:cNvSpPr txBox="1"/>
-            <p:nvPr/>
-          </p:nvSpPr>
-          <p:spPr>
-            <a:xfrm>
-              <a:off x="1971830" y="2431502"/>
-              <a:ext cx="2598039" cy="646331"/>
-            </a:xfrm>
-            <a:prstGeom prst="rect">
-              <a:avLst/>
-            </a:prstGeom>
-            <a:noFill/>
-            <a:ln>
-              <a:solidFill>
-                <a:srgbClr val="00B050"/>
-              </a:solidFill>
-            </a:ln>
-          </p:spPr>
-          <p:txBody>
-            <a:bodyPr wrap="square" rtlCol="0">
-              <a:spAutoFit/>
-            </a:bodyPr>
-            <a:lstStyle/>
-            <a:p>
-              <a:r>
-                <a:rPr lang="it-IT" sz="3600" dirty="0" smtClean="0"/>
-                <a:t>0%</a:t>
-              </a:r>
-              <a:endParaRPr lang="it-IT" sz="3600" dirty="0"/>
-            </a:p>
-          </p:txBody>
-        </p:sp>
-        <p:sp>
-          <p:nvSpPr>
-            <p:cNvPr id="96" name="CasellaDiTesto 95"/>
-            <p:cNvSpPr txBox="1"/>
-            <p:nvPr/>
-          </p:nvSpPr>
-          <p:spPr>
-            <a:xfrm>
-              <a:off x="1965786" y="1656324"/>
-              <a:ext cx="1347093" cy="646331"/>
-            </a:xfrm>
-            <a:prstGeom prst="rect">
-              <a:avLst/>
-            </a:prstGeom>
-            <a:solidFill>
-              <a:srgbClr val="FFC000"/>
-            </a:solidFill>
-            <a:ln>
-              <a:solidFill>
-                <a:srgbClr val="FFC000"/>
-              </a:solidFill>
-            </a:ln>
-          </p:spPr>
-          <p:txBody>
-            <a:bodyPr wrap="square" rtlCol="0">
-              <a:spAutoFit/>
-            </a:bodyPr>
-            <a:lstStyle/>
-            <a:p>
-              <a:r>
-                <a:rPr lang="it-IT" sz="3600" dirty="0" smtClean="0"/>
-                <a:t>50%</a:t>
-              </a:r>
-              <a:endParaRPr lang="it-IT" sz="3600" dirty="0"/>
-            </a:p>
-          </p:txBody>
-        </p:sp>
-      </p:grpSp>
-      <p:grpSp>
-        <p:nvGrpSpPr>
-          <p:cNvPr id="97" name="Gruppo 96"/>
-          <p:cNvGrpSpPr/>
-          <p:nvPr/>
-        </p:nvGrpSpPr>
-        <p:grpSpPr>
-          <a:xfrm>
-            <a:off x="296151" y="3717869"/>
-            <a:ext cx="4569868" cy="2454583"/>
-            <a:chOff x="1" y="782529"/>
-            <a:chExt cx="4569868" cy="2454583"/>
-          </a:xfrm>
-        </p:grpSpPr>
-        <p:sp>
-          <p:nvSpPr>
-            <p:cNvPr id="98" name="Rettangolo 97"/>
-            <p:cNvSpPr/>
-            <p:nvPr/>
-          </p:nvSpPr>
-          <p:spPr>
-            <a:xfrm rot="16200000">
-              <a:off x="-765626" y="1548156"/>
-              <a:ext cx="2454583" cy="923330"/>
-            </a:xfrm>
-            <a:prstGeom prst="rect">
-              <a:avLst/>
-            </a:prstGeom>
-            <a:noFill/>
-          </p:spPr>
-          <p:txBody>
-            <a:bodyPr wrap="none" lIns="91440" tIns="45720" rIns="91440" bIns="45720">
-              <a:spAutoFit/>
-            </a:bodyPr>
-            <a:lstStyle/>
-            <a:p>
-              <a:pPr algn="ctr"/>
-              <a:r>
-                <a:rPr lang="it-IT" sz="5400" b="0" cap="none" spc="0" dirty="0" smtClean="0">
-                  <a:ln w="0"/>
-                  <a:solidFill>
-                    <a:schemeClr val="accent1"/>
-                  </a:solidFill>
-                  <a:effectLst>
-                    <a:outerShdw blurRad="38100" dist="25400" dir="5400000" algn="ctr" rotWithShape="0">
-                      <a:srgbClr val="6E747A">
-                        <a:alpha val="43000"/>
-                      </a:srgbClr>
-                    </a:outerShdw>
-                  </a:effectLst>
-                </a:rPr>
-                <a:t>Group </a:t>
-              </a:r>
-              <a:r>
-                <a:rPr lang="it-IT" sz="5400" b="0" cap="none" spc="0" dirty="0" smtClean="0">
-                  <a:ln w="0"/>
-                  <a:solidFill>
-                    <a:schemeClr val="accent1"/>
-                  </a:solidFill>
-                  <a:effectLst>
-                    <a:outerShdw blurRad="38100" dist="25400" dir="5400000" algn="ctr" rotWithShape="0">
-                      <a:srgbClr val="6E747A">
-                        <a:alpha val="43000"/>
-                      </a:srgbClr>
-                    </a:outerShdw>
-                  </a:effectLst>
-                </a:rPr>
-                <a:t>2</a:t>
-              </a:r>
-              <a:endParaRPr lang="it-IT" sz="5400" b="0" cap="none" spc="0" dirty="0" smtClean="0">
-                <a:ln w="0"/>
-                <a:solidFill>
-                  <a:schemeClr val="accent1"/>
-                </a:solidFill>
-                <a:effectLst>
-                  <a:outerShdw blurRad="38100" dist="25400" dir="5400000" algn="ctr" rotWithShape="0">
-                    <a:srgbClr val="6E747A">
-                      <a:alpha val="43000"/>
-                    </a:srgbClr>
-                  </a:outerShdw>
-                </a:effectLst>
-              </a:endParaRPr>
-            </a:p>
-          </p:txBody>
-        </p:sp>
-        <p:pic>
-          <p:nvPicPr>
-            <p:cNvPr id="99" name="Immagine 98"/>
-            <p:cNvPicPr>
-              <a:picLocks noChangeAspect="1"/>
-            </p:cNvPicPr>
-            <p:nvPr/>
-          </p:nvPicPr>
-          <p:blipFill>
-            <a:blip r:embed="rId2" cstate="print">
-              <a:extLst>
-                <a:ext uri="{28A0092B-C50C-407E-A947-70E740481C1C}">
-                  <a14:useLocalDpi xmlns:a14="http://schemas.microsoft.com/office/drawing/2010/main" val="0"/>
-                </a:ext>
-              </a:extLst>
-            </a:blip>
-            <a:stretch>
-              <a:fillRect/>
-            </a:stretch>
-          </p:blipFill>
-          <p:spPr>
-            <a:xfrm>
-              <a:off x="923331" y="1712452"/>
-              <a:ext cx="661736" cy="661736"/>
-            </a:xfrm>
-            <a:prstGeom prst="rect">
-              <a:avLst/>
-            </a:prstGeom>
-          </p:spPr>
-        </p:pic>
-        <p:pic>
-          <p:nvPicPr>
-            <p:cNvPr id="100" name="Immagine 99"/>
-            <p:cNvPicPr>
-              <a:picLocks noChangeAspect="1"/>
-            </p:cNvPicPr>
-            <p:nvPr/>
-          </p:nvPicPr>
-          <p:blipFill>
-            <a:blip r:embed="rId3">
-              <a:extLst>
-                <a:ext uri="{28A0092B-C50C-407E-A947-70E740481C1C}">
-                  <a14:useLocalDpi xmlns:a14="http://schemas.microsoft.com/office/drawing/2010/main" val="0"/>
-                </a:ext>
-              </a:extLst>
-            </a:blip>
-            <a:stretch>
-              <a:fillRect/>
-            </a:stretch>
-          </p:blipFill>
-          <p:spPr>
-            <a:xfrm>
-              <a:off x="883858" y="894958"/>
-              <a:ext cx="740682" cy="730250"/>
-            </a:xfrm>
-            <a:prstGeom prst="rect">
-              <a:avLst/>
-            </a:prstGeom>
-          </p:spPr>
-        </p:pic>
-        <p:pic>
-          <p:nvPicPr>
-            <p:cNvPr id="101" name="Immagine 100"/>
-            <p:cNvPicPr>
-              <a:picLocks noChangeAspect="1"/>
-            </p:cNvPicPr>
-            <p:nvPr/>
-          </p:nvPicPr>
-          <p:blipFill>
-            <a:blip r:embed="rId4">
-              <a:extLst>
-                <a:ext uri="{28A0092B-C50C-407E-A947-70E740481C1C}">
-                  <a14:useLocalDpi xmlns:a14="http://schemas.microsoft.com/office/drawing/2010/main" val="0"/>
-                </a:ext>
-              </a:extLst>
-            </a:blip>
-            <a:stretch>
-              <a:fillRect/>
-            </a:stretch>
-          </p:blipFill>
-          <p:spPr>
-            <a:xfrm>
-              <a:off x="749059" y="2448658"/>
-              <a:ext cx="1089225" cy="677333"/>
-            </a:xfrm>
-            <a:prstGeom prst="rect">
-              <a:avLst/>
-            </a:prstGeom>
-          </p:spPr>
-        </p:pic>
-        <p:sp>
-          <p:nvSpPr>
-            <p:cNvPr id="102" name="CasellaDiTesto 101"/>
-            <p:cNvSpPr txBox="1"/>
-            <p:nvPr/>
-          </p:nvSpPr>
-          <p:spPr>
-            <a:xfrm>
-              <a:off x="1965788" y="881147"/>
-              <a:ext cx="1357562" cy="646331"/>
-            </a:xfrm>
-            <a:prstGeom prst="rect">
-              <a:avLst/>
-            </a:prstGeom>
-            <a:solidFill>
-              <a:schemeClr val="accent1">
-                <a:lumMod val="75000"/>
-              </a:schemeClr>
-            </a:solidFill>
-          </p:spPr>
-          <p:txBody>
-            <a:bodyPr wrap="square" rtlCol="0">
-              <a:spAutoFit/>
-            </a:bodyPr>
-            <a:lstStyle/>
-            <a:p>
-              <a:r>
-                <a:rPr lang="it-IT" sz="3600" dirty="0" smtClean="0"/>
-                <a:t>50%</a:t>
-              </a:r>
-              <a:endParaRPr lang="it-IT" sz="3600" dirty="0"/>
-            </a:p>
-          </p:txBody>
-        </p:sp>
-        <p:sp>
-          <p:nvSpPr>
-            <p:cNvPr id="103" name="CasellaDiTesto 102"/>
-            <p:cNvSpPr txBox="1"/>
-            <p:nvPr/>
-          </p:nvSpPr>
-          <p:spPr>
-            <a:xfrm>
-              <a:off x="1971830" y="2431502"/>
-              <a:ext cx="2598039" cy="646331"/>
-            </a:xfrm>
-            <a:prstGeom prst="rect">
-              <a:avLst/>
-            </a:prstGeom>
-            <a:noFill/>
-            <a:ln>
-              <a:solidFill>
-                <a:srgbClr val="00B050"/>
-              </a:solidFill>
-            </a:ln>
-          </p:spPr>
-          <p:txBody>
-            <a:bodyPr wrap="square" rtlCol="0">
-              <a:spAutoFit/>
-            </a:bodyPr>
-            <a:lstStyle/>
-            <a:p>
-              <a:r>
-                <a:rPr lang="it-IT" sz="3600" dirty="0" smtClean="0"/>
-                <a:t>0%</a:t>
-              </a:r>
-              <a:endParaRPr lang="it-IT" sz="3600" dirty="0"/>
-            </a:p>
-          </p:txBody>
-        </p:sp>
-        <p:sp>
-          <p:nvSpPr>
-            <p:cNvPr id="104" name="CasellaDiTesto 103"/>
-            <p:cNvSpPr txBox="1"/>
-            <p:nvPr/>
-          </p:nvSpPr>
-          <p:spPr>
-            <a:xfrm>
-              <a:off x="1965787" y="1656324"/>
-              <a:ext cx="2005264" cy="646331"/>
-            </a:xfrm>
-            <a:prstGeom prst="rect">
-              <a:avLst/>
-            </a:prstGeom>
-            <a:solidFill>
-              <a:srgbClr val="FFC000"/>
-            </a:solidFill>
-            <a:ln>
-              <a:solidFill>
-                <a:srgbClr val="FFC000"/>
-              </a:solidFill>
-            </a:ln>
-          </p:spPr>
-          <p:txBody>
-            <a:bodyPr wrap="square" rtlCol="0">
-              <a:spAutoFit/>
-            </a:bodyPr>
-            <a:lstStyle/>
-            <a:p>
-              <a:r>
-                <a:rPr lang="it-IT" sz="3600" dirty="0" smtClean="0"/>
-                <a:t>80%</a:t>
-              </a:r>
-              <a:endParaRPr lang="it-IT" sz="3600" dirty="0"/>
-            </a:p>
-          </p:txBody>
-        </p:sp>
-      </p:grpSp>
-      <p:sp>
-        <p:nvSpPr>
-          <p:cNvPr id="105" name="CasellaDiTesto 104"/>
-          <p:cNvSpPr txBox="1"/>
-          <p:nvPr/>
-        </p:nvSpPr>
+        </p:nvPicPr>
+        <p:blipFill>
+          <a:blip r:embed="rId2">
+            <a:extLst>
+              <a:ext uri="{28A0092B-C50C-407E-A947-70E740481C1C}">
+                <a14:useLocalDpi xmlns:a14="http://schemas.microsoft.com/office/drawing/2010/main" val="0"/>
+              </a:ext>
+            </a:extLst>
+          </a:blip>
+          <a:stretch>
+            <a:fillRect/>
+          </a:stretch>
+        </p:blipFill>
         <p:spPr>
           <a:xfrm>
-            <a:off x="3866929" y="3173361"/>
-            <a:ext cx="2298700" cy="461665"/>
+            <a:off x="0" y="1673"/>
+            <a:ext cx="12192000" cy="6854653"/>
           </a:xfrm>
           <a:prstGeom prst="rect">
             <a:avLst/>
           </a:prstGeom>
-          <a:noFill/>
         </p:spPr>
-        <p:txBody>
-          <a:bodyPr wrap="square" rtlCol="0">
-            <a:spAutoFit/>
-          </a:bodyPr>
-          <a:lstStyle/>
-          <a:p>
-            <a:r>
-              <a:rPr lang="it-IT" sz="2400" u="sng" dirty="0" err="1" smtClean="0">
-                <a:solidFill>
-                  <a:srgbClr val="0070C0"/>
-                </a:solidFill>
-              </a:rPr>
-              <a:t>Details</a:t>
-            </a:r>
-            <a:endParaRPr lang="it-IT" sz="2400" u="sng" dirty="0">
-              <a:solidFill>
-                <a:srgbClr val="0070C0"/>
-              </a:solidFill>
-            </a:endParaRPr>
-          </a:p>
-        </p:txBody>
-      </p:sp>
-      <p:sp>
-        <p:nvSpPr>
-          <p:cNvPr id="106" name="CasellaDiTesto 105"/>
-          <p:cNvSpPr txBox="1"/>
-          <p:nvPr/>
-        </p:nvSpPr>
-        <p:spPr>
-          <a:xfrm>
-            <a:off x="3932470" y="6061331"/>
-            <a:ext cx="2298700" cy="461665"/>
-          </a:xfrm>
-          <a:prstGeom prst="rect">
-            <a:avLst/>
-          </a:prstGeom>
-          <a:noFill/>
-        </p:spPr>
-        <p:txBody>
-          <a:bodyPr wrap="square" rtlCol="0">
-            <a:spAutoFit/>
-          </a:bodyPr>
-          <a:lstStyle/>
-          <a:p>
-            <a:r>
-              <a:rPr lang="it-IT" sz="2400" u="sng" dirty="0" err="1" smtClean="0">
-                <a:solidFill>
-                  <a:srgbClr val="0070C0"/>
-                </a:solidFill>
-              </a:rPr>
-              <a:t>Details</a:t>
-            </a:r>
-            <a:endParaRPr lang="it-IT" sz="2400" u="sng" dirty="0">
-              <a:solidFill>
-                <a:srgbClr val="0070C0"/>
-              </a:solidFill>
-            </a:endParaRPr>
-          </a:p>
-        </p:txBody>
-      </p:sp>
-      <p:sp>
-        <p:nvSpPr>
-          <p:cNvPr id="107" name="CasellaDiTesto 106"/>
-          <p:cNvSpPr txBox="1"/>
-          <p:nvPr/>
-        </p:nvSpPr>
-        <p:spPr>
-          <a:xfrm>
-            <a:off x="8728359" y="5977669"/>
-            <a:ext cx="2298700" cy="461665"/>
-          </a:xfrm>
-          <a:prstGeom prst="rect">
-            <a:avLst/>
-          </a:prstGeom>
-          <a:noFill/>
-        </p:spPr>
-        <p:txBody>
-          <a:bodyPr wrap="square" rtlCol="0">
-            <a:spAutoFit/>
-          </a:bodyPr>
-          <a:lstStyle/>
-          <a:p>
-            <a:r>
-              <a:rPr lang="it-IT" sz="2400" u="sng" dirty="0" err="1" smtClean="0">
-                <a:solidFill>
-                  <a:srgbClr val="0070C0"/>
-                </a:solidFill>
-              </a:rPr>
-              <a:t>Details</a:t>
-            </a:r>
-            <a:endParaRPr lang="it-IT" sz="2400" u="sng" dirty="0">
-              <a:solidFill>
-                <a:srgbClr val="0070C0"/>
-              </a:solidFill>
-            </a:endParaRPr>
-          </a:p>
-        </p:txBody>
-      </p:sp>
-      <p:sp>
-        <p:nvSpPr>
-          <p:cNvPr id="108" name="CasellaDiTesto 107"/>
-          <p:cNvSpPr txBox="1"/>
-          <p:nvPr/>
-        </p:nvSpPr>
-        <p:spPr>
-          <a:xfrm>
-            <a:off x="8711854" y="3148878"/>
-            <a:ext cx="2298700" cy="461665"/>
-          </a:xfrm>
-          <a:prstGeom prst="rect">
-            <a:avLst/>
-          </a:prstGeom>
-          <a:noFill/>
-        </p:spPr>
-        <p:txBody>
-          <a:bodyPr wrap="square" rtlCol="0">
-            <a:spAutoFit/>
-          </a:bodyPr>
-          <a:lstStyle/>
-          <a:p>
-            <a:r>
-              <a:rPr lang="it-IT" sz="2400" u="sng" dirty="0" err="1" smtClean="0">
-                <a:solidFill>
-                  <a:srgbClr val="0070C0"/>
-                </a:solidFill>
-              </a:rPr>
-              <a:t>Details</a:t>
-            </a:r>
-            <a:endParaRPr lang="it-IT" sz="2400" u="sng" dirty="0">
-              <a:solidFill>
-                <a:srgbClr val="0070C0"/>
-              </a:solidFill>
-            </a:endParaRPr>
-          </a:p>
-        </p:txBody>
-      </p:sp>
+      </p:pic>
     </p:spTree>
     <p:extLst>
       <p:ext uri="{BB962C8B-B14F-4D97-AF65-F5344CB8AC3E}">
-        <p14:creationId xmlns:p14="http://schemas.microsoft.com/office/powerpoint/2010/main" val="1007686540"/>
+        <p14:creationId xmlns:p14="http://schemas.microsoft.com/office/powerpoint/2010/main" val="3450642753"/>
       </p:ext>
     </p:extLst>
   </p:cSld>

</xml_diff>